<commit_message>
integrated gsheets_create into main
</commit_message>
<xml_diff>
--- a/structure.pptx
+++ b/structure.pptx
@@ -112,6 +112,34 @@
 </p:presentation>
 </file>
 
+<file path=ppt/authors.xml><?xml version="1.0" encoding="utf-8"?>
+<p188:authorLst xmlns:a="http://schemas.openxmlformats.org/drawingml/2006/main" xmlns:r="http://schemas.openxmlformats.org/officeDocument/2006/relationships" xmlns:p188="http://schemas.microsoft.com/office/powerpoint/2018/8/main">
+  <p188:author id="{22F33BA7-7B8A-125E-CD07-B1B85F79EDDB}" name="Robin Jüngerich" initials="RJ" userId="Robin Jüngerich" providerId="None"/>
+</p188:authorLst>
+</file>
+
+<file path=ppt/comments/modernComment_101_708ADD6A.xml><?xml version="1.0" encoding="utf-8"?>
+<p188:cmLst xmlns:a="http://schemas.openxmlformats.org/drawingml/2006/main" xmlns:r="http://schemas.openxmlformats.org/officeDocument/2006/relationships" xmlns:p188="http://schemas.microsoft.com/office/powerpoint/2018/8/main">
+  <p188:cm id="{A4094FB0-4D75-EC4F-8529-C21A70C8D4E1}" authorId="{22F33BA7-7B8A-125E-CD07-B1B85F79EDDB}" created="2025-01-09T20:58:13.851">
+    <ac:deMkLst xmlns:ac="http://schemas.microsoft.com/office/drawing/2013/main/command">
+      <pc:docMk xmlns:pc="http://schemas.microsoft.com/office/powerpoint/2013/main/command"/>
+      <pc:sldMk xmlns:pc="http://schemas.microsoft.com/office/powerpoint/2013/main/command" cId="1888148842" sldId="257"/>
+      <ac:spMk id="2" creationId="{2FCB3C61-46FD-EE86-BE56-E97B7BF37E5B}"/>
+    </ac:deMkLst>
+    <p188:txBody>
+      <a:bodyPr/>
+      <a:lstStyle/>
+      <a:p>
+        <a:r>
+          <a:rPr lang="en-US"/>
+          <a:t>Create table</a:t>
+        </a:r>
+      </a:p>
+    </p188:txBody>
+  </p188:cm>
+</p188:cmLst>
+</file>
+
 <file path=ppt/slideLayouts/slideLayout1.xml><?xml version="1.0" encoding="utf-8"?>
 <p:sldLayout xmlns:a="http://schemas.openxmlformats.org/drawingml/2006/main" xmlns:r="http://schemas.openxmlformats.org/officeDocument/2006/relationships" xmlns:p="http://schemas.openxmlformats.org/presentationml/2006/main" type="title" preserve="1">
   <p:cSld name="Title Slide">
@@ -243,7 +271,7 @@
           <a:p>
             <a:fld id="{173B09CF-851B-D745-8933-39FE59118651}" type="datetimeFigureOut">
               <a:rPr lang="en-US" smtClean="0"/>
-              <a:t>12/27/24</a:t>
+              <a:t>1/9/25</a:t>
             </a:fld>
             <a:endParaRPr lang="en-US"/>
           </a:p>
@@ -413,7 +441,7 @@
           <a:p>
             <a:fld id="{173B09CF-851B-D745-8933-39FE59118651}" type="datetimeFigureOut">
               <a:rPr lang="en-US" smtClean="0"/>
-              <a:t>12/27/24</a:t>
+              <a:t>1/9/25</a:t>
             </a:fld>
             <a:endParaRPr lang="en-US"/>
           </a:p>
@@ -593,7 +621,7 @@
           <a:p>
             <a:fld id="{173B09CF-851B-D745-8933-39FE59118651}" type="datetimeFigureOut">
               <a:rPr lang="en-US" smtClean="0"/>
-              <a:t>12/27/24</a:t>
+              <a:t>1/9/25</a:t>
             </a:fld>
             <a:endParaRPr lang="en-US"/>
           </a:p>
@@ -763,7 +791,7 @@
           <a:p>
             <a:fld id="{173B09CF-851B-D745-8933-39FE59118651}" type="datetimeFigureOut">
               <a:rPr lang="en-US" smtClean="0"/>
-              <a:t>12/27/24</a:t>
+              <a:t>1/9/25</a:t>
             </a:fld>
             <a:endParaRPr lang="en-US"/>
           </a:p>
@@ -1009,7 +1037,7 @@
           <a:p>
             <a:fld id="{173B09CF-851B-D745-8933-39FE59118651}" type="datetimeFigureOut">
               <a:rPr lang="en-US" smtClean="0"/>
-              <a:t>12/27/24</a:t>
+              <a:t>1/9/25</a:t>
             </a:fld>
             <a:endParaRPr lang="en-US"/>
           </a:p>
@@ -1241,7 +1269,7 @@
           <a:p>
             <a:fld id="{173B09CF-851B-D745-8933-39FE59118651}" type="datetimeFigureOut">
               <a:rPr lang="en-US" smtClean="0"/>
-              <a:t>12/27/24</a:t>
+              <a:t>1/9/25</a:t>
             </a:fld>
             <a:endParaRPr lang="en-US"/>
           </a:p>
@@ -1608,7 +1636,7 @@
           <a:p>
             <a:fld id="{173B09CF-851B-D745-8933-39FE59118651}" type="datetimeFigureOut">
               <a:rPr lang="en-US" smtClean="0"/>
-              <a:t>12/27/24</a:t>
+              <a:t>1/9/25</a:t>
             </a:fld>
             <a:endParaRPr lang="en-US"/>
           </a:p>
@@ -1726,7 +1754,7 @@
           <a:p>
             <a:fld id="{173B09CF-851B-D745-8933-39FE59118651}" type="datetimeFigureOut">
               <a:rPr lang="en-US" smtClean="0"/>
-              <a:t>12/27/24</a:t>
+              <a:t>1/9/25</a:t>
             </a:fld>
             <a:endParaRPr lang="en-US"/>
           </a:p>
@@ -1821,7 +1849,7 @@
           <a:p>
             <a:fld id="{173B09CF-851B-D745-8933-39FE59118651}" type="datetimeFigureOut">
               <a:rPr lang="en-US" smtClean="0"/>
-              <a:t>12/27/24</a:t>
+              <a:t>1/9/25</a:t>
             </a:fld>
             <a:endParaRPr lang="en-US"/>
           </a:p>
@@ -2098,7 +2126,7 @@
           <a:p>
             <a:fld id="{173B09CF-851B-D745-8933-39FE59118651}" type="datetimeFigureOut">
               <a:rPr lang="en-US" smtClean="0"/>
-              <a:t>12/27/24</a:t>
+              <a:t>1/9/25</a:t>
             </a:fld>
             <a:endParaRPr lang="en-US"/>
           </a:p>
@@ -2355,7 +2383,7 @@
           <a:p>
             <a:fld id="{173B09CF-851B-D745-8933-39FE59118651}" type="datetimeFigureOut">
               <a:rPr lang="en-US" smtClean="0"/>
-              <a:t>12/27/24</a:t>
+              <a:t>1/9/25</a:t>
             </a:fld>
             <a:endParaRPr lang="en-US"/>
           </a:p>
@@ -2568,7 +2596,7 @@
           <a:p>
             <a:fld id="{173B09CF-851B-D745-8933-39FE59118651}" type="datetimeFigureOut">
               <a:rPr lang="en-US" smtClean="0"/>
-              <a:t>12/27/24</a:t>
+              <a:t>1/9/25</a:t>
             </a:fld>
             <a:endParaRPr lang="en-US"/>
           </a:p>
@@ -4567,6 +4595,216 @@
           </a:fontRef>
         </p:style>
       </p:cxnSp>
+      <p:sp>
+        <p:nvSpPr>
+          <p:cNvPr id="2" name="Rectangle 1">
+            <a:extLst>
+              <a:ext uri="{FF2B5EF4-FFF2-40B4-BE49-F238E27FC236}">
+                <a16:creationId xmlns:a16="http://schemas.microsoft.com/office/drawing/2014/main" id="{2FCB3C61-46FD-EE86-BE56-E97B7BF37E5B}"/>
+              </a:ext>
+            </a:extLst>
+          </p:cNvPr>
+          <p:cNvSpPr/>
+          <p:nvPr/>
+        </p:nvSpPr>
+        <p:spPr>
+          <a:xfrm>
+            <a:off x="5555998" y="6288755"/>
+            <a:ext cx="1080000" cy="468000"/>
+          </a:xfrm>
+          <a:prstGeom prst="rect">
+            <a:avLst/>
+          </a:prstGeom>
+        </p:spPr>
+        <p:style>
+          <a:lnRef idx="2">
+            <a:schemeClr val="accent2">
+              <a:shade val="15000"/>
+            </a:schemeClr>
+          </a:lnRef>
+          <a:fillRef idx="1">
+            <a:schemeClr val="accent2"/>
+          </a:fillRef>
+          <a:effectRef idx="0">
+            <a:schemeClr val="accent2"/>
+          </a:effectRef>
+          <a:fontRef idx="minor">
+            <a:schemeClr val="lt1"/>
+          </a:fontRef>
+        </p:style>
+        <p:txBody>
+          <a:bodyPr rtlCol="0" anchor="ctr"/>
+          <a:lstStyle/>
+          <a:p>
+            <a:pPr algn="ctr"/>
+            <a:r>
+              <a:rPr lang="en-US" sz="1100" dirty="0"/>
+              <a:t>table/</a:t>
+            </a:r>
+            <a:br>
+              <a:rPr lang="en-US" sz="1100" dirty="0"/>
+            </a:br>
+            <a:r>
+              <a:rPr lang="en-US" sz="1100" dirty="0" err="1"/>
+              <a:t>table_main</a:t>
+            </a:r>
+            <a:endParaRPr lang="en-US" sz="1100" dirty="0"/>
+          </a:p>
+        </p:txBody>
+      </p:sp>
+      <p:cxnSp>
+        <p:nvCxnSpPr>
+          <p:cNvPr id="4" name="Straight Arrow Connector 3">
+            <a:extLst>
+              <a:ext uri="{FF2B5EF4-FFF2-40B4-BE49-F238E27FC236}">
+                <a16:creationId xmlns:a16="http://schemas.microsoft.com/office/drawing/2014/main" id="{35EB1936-732B-9932-DC35-9A0006C6E89B}"/>
+              </a:ext>
+            </a:extLst>
+          </p:cNvPr>
+          <p:cNvCxnSpPr>
+            <a:cxnSpLocks/>
+            <a:stCxn id="76" idx="2"/>
+            <a:endCxn id="2" idx="0"/>
+          </p:cNvCxnSpPr>
+          <p:nvPr/>
+        </p:nvCxnSpPr>
+        <p:spPr>
+          <a:xfrm>
+            <a:off x="6095998" y="5996871"/>
+            <a:ext cx="0" cy="291884"/>
+          </a:xfrm>
+          <a:prstGeom prst="straightConnector1">
+            <a:avLst/>
+          </a:prstGeom>
+          <a:ln>
+            <a:solidFill>
+              <a:schemeClr val="tx1"/>
+            </a:solidFill>
+            <a:tailEnd type="triangle"/>
+          </a:ln>
+        </p:spPr>
+        <p:style>
+          <a:lnRef idx="2">
+            <a:schemeClr val="accent1"/>
+          </a:lnRef>
+          <a:fillRef idx="0">
+            <a:schemeClr val="accent1"/>
+          </a:fillRef>
+          <a:effectRef idx="1">
+            <a:schemeClr val="accent1"/>
+          </a:effectRef>
+          <a:fontRef idx="minor">
+            <a:schemeClr val="tx1"/>
+          </a:fontRef>
+        </p:style>
+      </p:cxnSp>
+      <p:sp>
+        <p:nvSpPr>
+          <p:cNvPr id="7" name="Rectangle 6">
+            <a:extLst>
+              <a:ext uri="{FF2B5EF4-FFF2-40B4-BE49-F238E27FC236}">
+                <a16:creationId xmlns:a16="http://schemas.microsoft.com/office/drawing/2014/main" id="{D633B940-C3B2-5F4D-3145-829BBB6D5D24}"/>
+              </a:ext>
+            </a:extLst>
+          </p:cNvPr>
+          <p:cNvSpPr/>
+          <p:nvPr/>
+        </p:nvSpPr>
+        <p:spPr>
+          <a:xfrm>
+            <a:off x="5555998" y="7048639"/>
+            <a:ext cx="1080000" cy="468000"/>
+          </a:xfrm>
+          <a:prstGeom prst="rect">
+            <a:avLst/>
+          </a:prstGeom>
+        </p:spPr>
+        <p:style>
+          <a:lnRef idx="2">
+            <a:schemeClr val="accent3">
+              <a:shade val="15000"/>
+            </a:schemeClr>
+          </a:lnRef>
+          <a:fillRef idx="1">
+            <a:schemeClr val="accent3"/>
+          </a:fillRef>
+          <a:effectRef idx="0">
+            <a:schemeClr val="accent3"/>
+          </a:effectRef>
+          <a:fontRef idx="minor">
+            <a:schemeClr val="lt1"/>
+          </a:fontRef>
+        </p:style>
+        <p:txBody>
+          <a:bodyPr rtlCol="0" anchor="ctr"/>
+          <a:lstStyle/>
+          <a:p>
+            <a:pPr algn="ctr"/>
+            <a:r>
+              <a:rPr lang="en-US" sz="1000" dirty="0" err="1"/>
+              <a:t>gsheets</a:t>
+            </a:r>
+            <a:r>
+              <a:rPr lang="en-US" sz="1000" dirty="0"/>
+              <a:t>/</a:t>
+            </a:r>
+            <a:br>
+              <a:rPr lang="en-US" sz="1000" dirty="0"/>
+            </a:br>
+            <a:r>
+              <a:rPr lang="en-US" sz="1000" dirty="0" err="1"/>
+              <a:t>export_results</a:t>
+            </a:r>
+            <a:endParaRPr lang="en-US" sz="1000" dirty="0"/>
+          </a:p>
+        </p:txBody>
+      </p:sp>
+      <p:cxnSp>
+        <p:nvCxnSpPr>
+          <p:cNvPr id="8" name="Straight Arrow Connector 7">
+            <a:extLst>
+              <a:ext uri="{FF2B5EF4-FFF2-40B4-BE49-F238E27FC236}">
+                <a16:creationId xmlns:a16="http://schemas.microsoft.com/office/drawing/2014/main" id="{D2C39A71-099A-ADDE-F8BB-9655C94010EC}"/>
+              </a:ext>
+            </a:extLst>
+          </p:cNvPr>
+          <p:cNvCxnSpPr>
+            <a:cxnSpLocks/>
+            <a:stCxn id="2" idx="2"/>
+            <a:endCxn id="7" idx="0"/>
+          </p:cNvCxnSpPr>
+          <p:nvPr/>
+        </p:nvCxnSpPr>
+        <p:spPr>
+          <a:xfrm>
+            <a:off x="6095998" y="6756755"/>
+            <a:ext cx="0" cy="291884"/>
+          </a:xfrm>
+          <a:prstGeom prst="straightConnector1">
+            <a:avLst/>
+          </a:prstGeom>
+          <a:ln>
+            <a:solidFill>
+              <a:schemeClr val="tx1"/>
+            </a:solidFill>
+            <a:tailEnd type="triangle"/>
+          </a:ln>
+        </p:spPr>
+        <p:style>
+          <a:lnRef idx="2">
+            <a:schemeClr val="accent1"/>
+          </a:lnRef>
+          <a:fillRef idx="0">
+            <a:schemeClr val="accent1"/>
+          </a:fillRef>
+          <a:effectRef idx="1">
+            <a:schemeClr val="accent1"/>
+          </a:effectRef>
+          <a:fontRef idx="minor">
+            <a:schemeClr val="tx1"/>
+          </a:fontRef>
+        </p:style>
+      </p:cxnSp>
     </p:spTree>
     <p:extLst>
       <p:ext uri="{BB962C8B-B14F-4D97-AF65-F5344CB8AC3E}">
@@ -4577,6 +4815,11 @@
   <p:clrMapOvr>
     <a:masterClrMapping/>
   </p:clrMapOvr>
+  <p:extLst>
+    <p:ext uri="{6950BFC3-D8DA-4A85-94F7-54DA5524770B}">
+      <p188:commentRel xmlns:p188="http://schemas.microsoft.com/office/powerpoint/2018/8/main" r:id="rId2"/>
+    </p:ext>
+  </p:extLst>
 </p:sld>
 </file>
 

</xml_diff>